<commit_message>
Updated PPT presentation slides.
</commit_message>
<xml_diff>
--- a/docs/DHIS_2_FHIR_Adapter_-_An_Overview.pptx
+++ b/docs/DHIS_2_FHIR_Adapter_-_An_Overview.pptx
@@ -1490,7 +1490,7 @@
   <p:cSld>
     <p:spTree>
       <p:nvGrpSpPr>
-        <p:cNvPr id="147" name="Shape 147"/>
+        <p:cNvPr id="149" name="Shape 149"/>
         <p:cNvGrpSpPr/>
         <p:nvPr/>
       </p:nvGrpSpPr>
@@ -1504,7 +1504,7 @@
       </p:grpSpPr>
       <p:sp>
         <p:nvSpPr>
-          <p:cNvPr id="148" name="Google Shape;148;g4f417ecd79_1_213:notes"/>
+          <p:cNvPr id="150" name="Google Shape;150;g4f417ecd79_1_213:notes"/>
           <p:cNvSpPr/>
           <p:nvPr>
             <p:ph idx="2" type="sldImg"/>
@@ -1539,7 +1539,7 @@
       </p:sp>
       <p:sp>
         <p:nvSpPr>
-          <p:cNvPr id="149" name="Google Shape;149;g4f417ecd79_1_213:notes"/>
+          <p:cNvPr id="151" name="Google Shape;151;g4f417ecd79_1_213:notes"/>
           <p:cNvSpPr txBox="1"/>
           <p:nvPr>
             <p:ph idx="1" type="body"/>
@@ -7492,7 +7492,7 @@
             </a:pPr>
             <a:r>
               <a:rPr lang="en"/>
-              <a:t>5 February 2019</a:t>
+              <a:t>19 February 2019</a:t>
             </a:r>
             <a:endParaRPr/>
           </a:p>
@@ -8263,7 +8263,7 @@
             </a:pPr>
             <a:r>
               <a:rPr lang="en"/>
-              <a:t>Various domain specific utilities (e.g.handling vital signs</a:t>
+              <a:t>Various domain specific utilities (e.g. handling vital signs</a:t>
             </a:r>
             <a:r>
               <a:rPr lang="en"/>
@@ -8382,7 +8382,7 @@
         </p:nvSpPr>
         <p:spPr>
           <a:xfrm>
-            <a:off x="311700" y="1152475"/>
+            <a:off x="311700" y="1017725"/>
             <a:ext cx="8520600" cy="3416400"/>
           </a:xfrm>
           <a:prstGeom prst="rect">
@@ -8419,6 +8419,23 @@
             <a:r>
               <a:rPr lang="en"/>
               <a:t>(export of DHIS 2 Resources to HL7® FHIR® experimental currently).</a:t>
+            </a:r>
+            <a:endParaRPr/>
+          </a:p>
+          <a:p>
+            <a:pPr indent="-342900" lvl="0" marL="457200" rtl="0" algn="l">
+              <a:spcBef>
+                <a:spcPts val="0"/>
+              </a:spcBef>
+              <a:spcAft>
+                <a:spcPts val="0"/>
+              </a:spcAft>
+              <a:buSzPts val="1800"/>
+              <a:buChar char="-"/>
+            </a:pPr>
+            <a:r>
+              <a:rPr lang="en"/>
+              <a:t>HL7® FHIR® REST Interfaces that create, update and read data based on rules that are defined in the Adapter (under development, feature similar to import and export).</a:t>
             </a:r>
             <a:endParaRPr/>
           </a:p>
@@ -8572,7 +8589,7 @@
             </a:pPr>
             <a:r>
               <a:rPr lang="en"/>
-              <a:t>Supported HL7® FHIR® Resources STU3</a:t>
+              <a:t>Supported HL7® FHIR® Resources STU3 and R4</a:t>
             </a:r>
             <a:endParaRPr/>
           </a:p>
@@ -8581,6 +8598,422 @@
       <p:sp>
         <p:nvSpPr>
           <p:cNvPr id="146" name="Google Shape;146;p28"/>
+          <p:cNvSpPr txBox="1"/>
+          <p:nvPr>
+            <p:ph idx="1" type="body"/>
+          </p:nvPr>
+        </p:nvSpPr>
+        <p:spPr>
+          <a:xfrm>
+            <a:off x="311700" y="1152475"/>
+            <a:ext cx="4011300" cy="2067900"/>
+          </a:xfrm>
+          <a:prstGeom prst="rect">
+            <a:avLst/>
+          </a:prstGeom>
+        </p:spPr>
+        <p:txBody>
+          <a:bodyPr anchorCtr="0" anchor="t" bIns="91425" lIns="91425" spcFirstLastPara="1" rIns="91425" wrap="square" tIns="91425">
+            <a:noAutofit/>
+          </a:bodyPr>
+          <a:lstStyle/>
+          <a:p>
+            <a:pPr indent="-342900" lvl="0" marL="457200" rtl="0" algn="l">
+              <a:spcBef>
+                <a:spcPts val="0"/>
+              </a:spcBef>
+              <a:spcAft>
+                <a:spcPts val="0"/>
+              </a:spcAft>
+              <a:buSzPts val="1800"/>
+              <a:buChar char="-"/>
+            </a:pPr>
+            <a:r>
+              <a:rPr lang="en"/>
+              <a:t>Location</a:t>
+            </a:r>
+            <a:endParaRPr/>
+          </a:p>
+          <a:p>
+            <a:pPr indent="-342900" lvl="0" marL="457200" rtl="0" algn="l">
+              <a:spcBef>
+                <a:spcPts val="0"/>
+              </a:spcBef>
+              <a:spcAft>
+                <a:spcPts val="0"/>
+              </a:spcAft>
+              <a:buSzPts val="1800"/>
+              <a:buChar char="-"/>
+            </a:pPr>
+            <a:r>
+              <a:rPr lang="en"/>
+              <a:t>Organization</a:t>
+            </a:r>
+            <a:endParaRPr/>
+          </a:p>
+          <a:p>
+            <a:pPr indent="-342900" lvl="0" marL="457200" rtl="0" algn="l">
+              <a:spcBef>
+                <a:spcPts val="0"/>
+              </a:spcBef>
+              <a:spcAft>
+                <a:spcPts val="0"/>
+              </a:spcAft>
+              <a:buSzPts val="1800"/>
+              <a:buChar char="-"/>
+            </a:pPr>
+            <a:r>
+              <a:rPr lang="en"/>
+              <a:t>Patient</a:t>
+            </a:r>
+            <a:endParaRPr/>
+          </a:p>
+          <a:p>
+            <a:pPr indent="-342900" lvl="0" marL="457200" rtl="0" algn="l">
+              <a:spcBef>
+                <a:spcPts val="0"/>
+              </a:spcBef>
+              <a:spcAft>
+                <a:spcPts val="0"/>
+              </a:spcAft>
+              <a:buSzPts val="1800"/>
+              <a:buChar char="-"/>
+            </a:pPr>
+            <a:r>
+              <a:rPr lang="en"/>
+              <a:t>Related Person</a:t>
+            </a:r>
+            <a:endParaRPr/>
+          </a:p>
+          <a:p>
+            <a:pPr indent="-342900" lvl="0" marL="457200" rtl="0" algn="l">
+              <a:spcBef>
+                <a:spcPts val="0"/>
+              </a:spcBef>
+              <a:spcAft>
+                <a:spcPts val="0"/>
+              </a:spcAft>
+              <a:buSzPts val="1800"/>
+              <a:buChar char="-"/>
+            </a:pPr>
+            <a:r>
+              <a:rPr lang="en"/>
+              <a:t>Encounter</a:t>
+            </a:r>
+            <a:endParaRPr/>
+          </a:p>
+          <a:p>
+            <a:pPr indent="-342900" lvl="0" marL="457200" rtl="0" algn="l">
+              <a:spcBef>
+                <a:spcPts val="0"/>
+              </a:spcBef>
+              <a:spcAft>
+                <a:spcPts val="0"/>
+              </a:spcAft>
+              <a:buSzPts val="1800"/>
+              <a:buChar char="-"/>
+            </a:pPr>
+            <a:r>
+              <a:rPr lang="en"/>
+              <a:t>Diagnostic Report</a:t>
+            </a:r>
+            <a:endParaRPr/>
+          </a:p>
+          <a:p>
+            <a:pPr indent="0" lvl="0" marL="0" rtl="0" algn="l">
+              <a:spcBef>
+                <a:spcPts val="1600"/>
+              </a:spcBef>
+              <a:spcAft>
+                <a:spcPts val="1600"/>
+              </a:spcAft>
+              <a:buNone/>
+            </a:pPr>
+            <a:r>
+              <a:t/>
+            </a:r>
+            <a:endParaRPr/>
+          </a:p>
+        </p:txBody>
+      </p:sp>
+      <p:sp>
+        <p:nvSpPr>
+          <p:cNvPr id="147" name="Google Shape;147;p28"/>
+          <p:cNvSpPr txBox="1"/>
+          <p:nvPr>
+            <p:ph idx="1" type="body"/>
+          </p:nvPr>
+        </p:nvSpPr>
+        <p:spPr>
+          <a:xfrm>
+            <a:off x="4821000" y="1152475"/>
+            <a:ext cx="4011300" cy="1823700"/>
+          </a:xfrm>
+          <a:prstGeom prst="rect">
+            <a:avLst/>
+          </a:prstGeom>
+        </p:spPr>
+        <p:txBody>
+          <a:bodyPr anchorCtr="0" anchor="t" bIns="91425" lIns="91425" spcFirstLastPara="1" rIns="91425" wrap="square" tIns="91425">
+            <a:noAutofit/>
+          </a:bodyPr>
+          <a:lstStyle/>
+          <a:p>
+            <a:pPr indent="-342900" lvl="0" marL="457200" rtl="0" algn="l">
+              <a:spcBef>
+                <a:spcPts val="0"/>
+              </a:spcBef>
+              <a:spcAft>
+                <a:spcPts val="0"/>
+              </a:spcAft>
+              <a:buSzPts val="1800"/>
+              <a:buChar char="-"/>
+            </a:pPr>
+            <a:r>
+              <a:rPr lang="en"/>
+              <a:t>Immunization</a:t>
+            </a:r>
+            <a:endParaRPr/>
+          </a:p>
+          <a:p>
+            <a:pPr indent="-342900" lvl="0" marL="457200" rtl="0" algn="l">
+              <a:spcBef>
+                <a:spcPts val="0"/>
+              </a:spcBef>
+              <a:spcAft>
+                <a:spcPts val="0"/>
+              </a:spcAft>
+              <a:buSzPts val="1800"/>
+              <a:buChar char="-"/>
+            </a:pPr>
+            <a:r>
+              <a:rPr lang="en"/>
+              <a:t>Medication Request</a:t>
+            </a:r>
+            <a:endParaRPr/>
+          </a:p>
+          <a:p>
+            <a:pPr indent="-342900" lvl="0" marL="457200" rtl="0" algn="l">
+              <a:spcBef>
+                <a:spcPts val="0"/>
+              </a:spcBef>
+              <a:spcAft>
+                <a:spcPts val="0"/>
+              </a:spcAft>
+              <a:buSzPts val="1800"/>
+              <a:buChar char="-"/>
+            </a:pPr>
+            <a:r>
+              <a:rPr lang="en"/>
+              <a:t>Observation</a:t>
+            </a:r>
+            <a:endParaRPr/>
+          </a:p>
+          <a:p>
+            <a:pPr indent="-342900" lvl="0" marL="457200" rtl="0" algn="l">
+              <a:spcBef>
+                <a:spcPts val="0"/>
+              </a:spcBef>
+              <a:spcAft>
+                <a:spcPts val="0"/>
+              </a:spcAft>
+              <a:buSzPts val="1800"/>
+              <a:buChar char="-"/>
+            </a:pPr>
+            <a:r>
+              <a:rPr lang="en"/>
+              <a:t>Practitioner</a:t>
+            </a:r>
+            <a:endParaRPr/>
+          </a:p>
+          <a:p>
+            <a:pPr indent="-342900" lvl="0" marL="457200" rtl="0" algn="l">
+              <a:spcBef>
+                <a:spcPts val="0"/>
+              </a:spcBef>
+              <a:spcAft>
+                <a:spcPts val="0"/>
+              </a:spcAft>
+              <a:buSzPts val="1800"/>
+              <a:buChar char="-"/>
+            </a:pPr>
+            <a:r>
+              <a:rPr lang="en"/>
+              <a:t>Condition</a:t>
+            </a:r>
+            <a:endParaRPr/>
+          </a:p>
+          <a:p>
+            <a:pPr indent="0" lvl="0" marL="0" rtl="0" algn="l">
+              <a:spcBef>
+                <a:spcPts val="1600"/>
+              </a:spcBef>
+              <a:spcAft>
+                <a:spcPts val="1600"/>
+              </a:spcAft>
+              <a:buNone/>
+            </a:pPr>
+            <a:r>
+              <a:t/>
+            </a:r>
+            <a:endParaRPr/>
+          </a:p>
+        </p:txBody>
+      </p:sp>
+      <p:sp>
+        <p:nvSpPr>
+          <p:cNvPr id="148" name="Google Shape;148;p28"/>
+          <p:cNvSpPr txBox="1"/>
+          <p:nvPr/>
+        </p:nvSpPr>
+        <p:spPr>
+          <a:xfrm>
+            <a:off x="346350" y="3355125"/>
+            <a:ext cx="8451300" cy="967200"/>
+          </a:xfrm>
+          <a:prstGeom prst="rect">
+            <a:avLst/>
+          </a:prstGeom>
+          <a:noFill/>
+          <a:ln>
+            <a:noFill/>
+          </a:ln>
+        </p:spPr>
+        <p:txBody>
+          <a:bodyPr anchorCtr="0" anchor="t" bIns="91425" lIns="91425" spcFirstLastPara="1" rIns="91425" wrap="square" tIns="91425">
+            <a:noAutofit/>
+          </a:bodyPr>
+          <a:lstStyle/>
+          <a:p>
+            <a:pPr indent="0" lvl="0" marL="0" rtl="0" algn="l">
+              <a:lnSpc>
+                <a:spcPct val="115000"/>
+              </a:lnSpc>
+              <a:spcBef>
+                <a:spcPts val="0"/>
+              </a:spcBef>
+              <a:spcAft>
+                <a:spcPts val="0"/>
+              </a:spcAft>
+              <a:buClr>
+                <a:schemeClr val="dk1"/>
+              </a:buClr>
+              <a:buSzPts val="1100"/>
+              <a:buFont typeface="Arial"/>
+              <a:buNone/>
+            </a:pPr>
+            <a:r>
+              <a:rPr lang="en" sz="1800">
+                <a:solidFill>
+                  <a:srgbClr val="011529"/>
+                </a:solidFill>
+                <a:latin typeface="Rubik"/>
+                <a:ea typeface="Rubik"/>
+                <a:cs typeface="Rubik"/>
+                <a:sym typeface="Rubik"/>
+              </a:rPr>
+              <a:t>The table above lists all FHIR Resources that can be configured in rules. Base configuration may not exist after the installation of the Adapter, but can be added as required by the needs of the specific DHIS 2 installation. </a:t>
+            </a:r>
+            <a:endParaRPr sz="1800">
+              <a:solidFill>
+                <a:srgbClr val="011529"/>
+              </a:solidFill>
+              <a:latin typeface="Rubik"/>
+              <a:ea typeface="Rubik"/>
+              <a:cs typeface="Rubik"/>
+              <a:sym typeface="Rubik"/>
+            </a:endParaRPr>
+          </a:p>
+          <a:p>
+            <a:pPr indent="0" lvl="0" marL="0" rtl="0" algn="l">
+              <a:spcBef>
+                <a:spcPts val="1600"/>
+              </a:spcBef>
+              <a:spcAft>
+                <a:spcPts val="0"/>
+              </a:spcAft>
+              <a:buNone/>
+            </a:pPr>
+            <a:r>
+              <a:t/>
+            </a:r>
+            <a:endParaRPr>
+              <a:latin typeface="Rubik"/>
+              <a:ea typeface="Rubik"/>
+              <a:cs typeface="Rubik"/>
+              <a:sym typeface="Rubik"/>
+            </a:endParaRPr>
+          </a:p>
+        </p:txBody>
+      </p:sp>
+    </p:spTree>
+  </p:cSld>
+  <p:clrMapOvr>
+    <a:masterClrMapping/>
+  </p:clrMapOvr>
+</p:sld>
+</file>
+
+<file path=ppt/slides/slide17.xml><?xml version="1.0" encoding="utf-8"?>
+<p:sld xmlns:a="http://schemas.openxmlformats.org/drawingml/2006/main" xmlns:r="http://schemas.openxmlformats.org/officeDocument/2006/relationships" xmlns:mc="http://schemas.openxmlformats.org/markup-compatibility/2006" xmlns:mv="urn:schemas-microsoft-com:mac:vml" xmlns:p="http://schemas.openxmlformats.org/presentationml/2006/main" xmlns:c="http://schemas.openxmlformats.org/drawingml/2006/chart" xmlns:dgm="http://schemas.openxmlformats.org/drawingml/2006/diagram" xmlns:o="urn:schemas-microsoft-com:office:office" xmlns:v="urn:schemas-microsoft-com:vml" xmlns:pvml="urn:schemas-microsoft-com:office:powerpoint" xmlns:com="http://schemas.openxmlformats.org/drawingml/2006/compatibility" xmlns:p14="http://schemas.microsoft.com/office/powerpoint/2010/main" xmlns:p15="http://schemas.microsoft.com/office/powerpoint/2012/main">
+  <p:cSld>
+    <p:spTree>
+      <p:nvGrpSpPr>
+        <p:cNvPr id="152" name="Shape 152"/>
+        <p:cNvGrpSpPr/>
+        <p:nvPr/>
+      </p:nvGrpSpPr>
+      <p:grpSpPr>
+        <a:xfrm>
+          <a:off x="0" y="0"/>
+          <a:ext cx="0" cy="0"/>
+          <a:chOff x="0" y="0"/>
+          <a:chExt cx="0" cy="0"/>
+        </a:xfrm>
+      </p:grpSpPr>
+      <p:sp>
+        <p:nvSpPr>
+          <p:cNvPr id="153" name="Google Shape;153;p29"/>
+          <p:cNvSpPr txBox="1"/>
+          <p:nvPr>
+            <p:ph type="title"/>
+          </p:nvPr>
+        </p:nvSpPr>
+        <p:spPr>
+          <a:xfrm>
+            <a:off x="311700" y="445025"/>
+            <a:ext cx="8520600" cy="572700"/>
+          </a:xfrm>
+          <a:prstGeom prst="rect">
+            <a:avLst/>
+          </a:prstGeom>
+        </p:spPr>
+        <p:txBody>
+          <a:bodyPr anchorCtr="0" anchor="t" bIns="91425" lIns="91425" spcFirstLastPara="1" rIns="91425" wrap="square" tIns="91425">
+            <a:noAutofit/>
+          </a:bodyPr>
+          <a:lstStyle/>
+          <a:p>
+            <a:pPr indent="0" lvl="0" marL="0" rtl="0" algn="l">
+              <a:spcBef>
+                <a:spcPts val="0"/>
+              </a:spcBef>
+              <a:spcAft>
+                <a:spcPts val="0"/>
+              </a:spcAft>
+              <a:buNone/>
+            </a:pPr>
+            <a:r>
+              <a:rPr lang="en"/>
+              <a:t>References</a:t>
+            </a:r>
+            <a:endParaRPr/>
+          </a:p>
+        </p:txBody>
+      </p:sp>
+      <p:sp>
+        <p:nvSpPr>
+          <p:cNvPr id="154" name="Google Shape;154;p29"/>
           <p:cNvSpPr txBox="1"/>
           <p:nvPr>
             <p:ph idx="1" type="body"/>
@@ -8613,271 +9046,6 @@
             </a:pPr>
             <a:r>
               <a:rPr lang="en"/>
-              <a:t>Location</a:t>
-            </a:r>
-            <a:endParaRPr/>
-          </a:p>
-          <a:p>
-            <a:pPr indent="-342900" lvl="0" marL="457200" rtl="0" algn="l">
-              <a:spcBef>
-                <a:spcPts val="0"/>
-              </a:spcBef>
-              <a:spcAft>
-                <a:spcPts val="0"/>
-              </a:spcAft>
-              <a:buSzPts val="1800"/>
-              <a:buChar char="-"/>
-            </a:pPr>
-            <a:r>
-              <a:rPr lang="en"/>
-              <a:t>Organization</a:t>
-            </a:r>
-            <a:endParaRPr/>
-          </a:p>
-          <a:p>
-            <a:pPr indent="-342900" lvl="0" marL="457200" rtl="0" algn="l">
-              <a:spcBef>
-                <a:spcPts val="0"/>
-              </a:spcBef>
-              <a:spcAft>
-                <a:spcPts val="0"/>
-              </a:spcAft>
-              <a:buSzPts val="1800"/>
-              <a:buChar char="-"/>
-            </a:pPr>
-            <a:r>
-              <a:rPr lang="en"/>
-              <a:t>Patient</a:t>
-            </a:r>
-            <a:endParaRPr/>
-          </a:p>
-          <a:p>
-            <a:pPr indent="-342900" lvl="0" marL="457200" rtl="0" algn="l">
-              <a:spcBef>
-                <a:spcPts val="0"/>
-              </a:spcBef>
-              <a:spcAft>
-                <a:spcPts val="0"/>
-              </a:spcAft>
-              <a:buSzPts val="1800"/>
-              <a:buChar char="-"/>
-            </a:pPr>
-            <a:r>
-              <a:rPr lang="en"/>
-              <a:t>Related Person</a:t>
-            </a:r>
-            <a:endParaRPr/>
-          </a:p>
-          <a:p>
-            <a:pPr indent="-342900" lvl="0" marL="457200" rtl="0" algn="l">
-              <a:spcBef>
-                <a:spcPts val="0"/>
-              </a:spcBef>
-              <a:spcAft>
-                <a:spcPts val="0"/>
-              </a:spcAft>
-              <a:buSzPts val="1800"/>
-              <a:buChar char="-"/>
-            </a:pPr>
-            <a:r>
-              <a:rPr lang="en"/>
-              <a:t>Encounter</a:t>
-            </a:r>
-            <a:endParaRPr/>
-          </a:p>
-          <a:p>
-            <a:pPr indent="-342900" lvl="0" marL="457200" rtl="0" algn="l">
-              <a:spcBef>
-                <a:spcPts val="0"/>
-              </a:spcBef>
-              <a:spcAft>
-                <a:spcPts val="0"/>
-              </a:spcAft>
-              <a:buSzPts val="1800"/>
-              <a:buChar char="-"/>
-            </a:pPr>
-            <a:r>
-              <a:rPr lang="en"/>
-              <a:t>Diagnostic Report</a:t>
-            </a:r>
-            <a:endParaRPr/>
-          </a:p>
-          <a:p>
-            <a:pPr indent="-342900" lvl="0" marL="457200" rtl="0" algn="l">
-              <a:spcBef>
-                <a:spcPts val="0"/>
-              </a:spcBef>
-              <a:spcAft>
-                <a:spcPts val="0"/>
-              </a:spcAft>
-              <a:buSzPts val="1800"/>
-              <a:buChar char="-"/>
-            </a:pPr>
-            <a:r>
-              <a:rPr lang="en"/>
-              <a:t>Immunization</a:t>
-            </a:r>
-            <a:endParaRPr/>
-          </a:p>
-          <a:p>
-            <a:pPr indent="-342900" lvl="0" marL="457200" rtl="0" algn="l">
-              <a:spcBef>
-                <a:spcPts val="0"/>
-              </a:spcBef>
-              <a:spcAft>
-                <a:spcPts val="0"/>
-              </a:spcAft>
-              <a:buSzPts val="1800"/>
-              <a:buChar char="-"/>
-            </a:pPr>
-            <a:r>
-              <a:rPr lang="en"/>
-              <a:t>Medication Request</a:t>
-            </a:r>
-            <a:endParaRPr/>
-          </a:p>
-          <a:p>
-            <a:pPr indent="-342900" lvl="0" marL="457200" rtl="0" algn="l">
-              <a:spcBef>
-                <a:spcPts val="0"/>
-              </a:spcBef>
-              <a:spcAft>
-                <a:spcPts val="0"/>
-              </a:spcAft>
-              <a:buSzPts val="1800"/>
-              <a:buChar char="-"/>
-            </a:pPr>
-            <a:r>
-              <a:rPr lang="en"/>
-              <a:t>Observation</a:t>
-            </a:r>
-            <a:endParaRPr/>
-          </a:p>
-          <a:p>
-            <a:pPr indent="0" lvl="0" marL="0" rtl="0" algn="l">
-              <a:spcBef>
-                <a:spcPts val="1600"/>
-              </a:spcBef>
-              <a:spcAft>
-                <a:spcPts val="1600"/>
-              </a:spcAft>
-              <a:buNone/>
-            </a:pPr>
-            <a:r>
-              <a:rPr lang="en"/>
-              <a:t>More Resources may be added depending on further </a:t>
-            </a:r>
-            <a:br>
-              <a:rPr lang="en"/>
-            </a:br>
-            <a:r>
-              <a:rPr lang="en"/>
-              <a:t>use case related requirements.</a:t>
-            </a:r>
-            <a:endParaRPr/>
-          </a:p>
-        </p:txBody>
-      </p:sp>
-    </p:spTree>
-  </p:cSld>
-  <p:clrMapOvr>
-    <a:masterClrMapping/>
-  </p:clrMapOvr>
-</p:sld>
-</file>
-
-<file path=ppt/slides/slide17.xml><?xml version="1.0" encoding="utf-8"?>
-<p:sld xmlns:a="http://schemas.openxmlformats.org/drawingml/2006/main" xmlns:r="http://schemas.openxmlformats.org/officeDocument/2006/relationships" xmlns:mc="http://schemas.openxmlformats.org/markup-compatibility/2006" xmlns:mv="urn:schemas-microsoft-com:mac:vml" xmlns:p="http://schemas.openxmlformats.org/presentationml/2006/main" xmlns:c="http://schemas.openxmlformats.org/drawingml/2006/chart" xmlns:dgm="http://schemas.openxmlformats.org/drawingml/2006/diagram" xmlns:o="urn:schemas-microsoft-com:office:office" xmlns:v="urn:schemas-microsoft-com:vml" xmlns:pvml="urn:schemas-microsoft-com:office:powerpoint" xmlns:com="http://schemas.openxmlformats.org/drawingml/2006/compatibility" xmlns:p14="http://schemas.microsoft.com/office/powerpoint/2010/main" xmlns:p15="http://schemas.microsoft.com/office/powerpoint/2012/main">
-  <p:cSld>
-    <p:spTree>
-      <p:nvGrpSpPr>
-        <p:cNvPr id="150" name="Shape 150"/>
-        <p:cNvGrpSpPr/>
-        <p:nvPr/>
-      </p:nvGrpSpPr>
-      <p:grpSpPr>
-        <a:xfrm>
-          <a:off x="0" y="0"/>
-          <a:ext cx="0" cy="0"/>
-          <a:chOff x="0" y="0"/>
-          <a:chExt cx="0" cy="0"/>
-        </a:xfrm>
-      </p:grpSpPr>
-      <p:sp>
-        <p:nvSpPr>
-          <p:cNvPr id="151" name="Google Shape;151;p29"/>
-          <p:cNvSpPr txBox="1"/>
-          <p:nvPr>
-            <p:ph type="title"/>
-          </p:nvPr>
-        </p:nvSpPr>
-        <p:spPr>
-          <a:xfrm>
-            <a:off x="311700" y="445025"/>
-            <a:ext cx="8520600" cy="572700"/>
-          </a:xfrm>
-          <a:prstGeom prst="rect">
-            <a:avLst/>
-          </a:prstGeom>
-        </p:spPr>
-        <p:txBody>
-          <a:bodyPr anchorCtr="0" anchor="t" bIns="91425" lIns="91425" spcFirstLastPara="1" rIns="91425" wrap="square" tIns="91425">
-            <a:noAutofit/>
-          </a:bodyPr>
-          <a:lstStyle/>
-          <a:p>
-            <a:pPr indent="0" lvl="0" marL="0" rtl="0" algn="l">
-              <a:spcBef>
-                <a:spcPts val="0"/>
-              </a:spcBef>
-              <a:spcAft>
-                <a:spcPts val="0"/>
-              </a:spcAft>
-              <a:buNone/>
-            </a:pPr>
-            <a:r>
-              <a:rPr lang="en"/>
-              <a:t>References</a:t>
-            </a:r>
-            <a:endParaRPr/>
-          </a:p>
-        </p:txBody>
-      </p:sp>
-      <p:sp>
-        <p:nvSpPr>
-          <p:cNvPr id="152" name="Google Shape;152;p29"/>
-          <p:cNvSpPr txBox="1"/>
-          <p:nvPr>
-            <p:ph idx="1" type="body"/>
-          </p:nvPr>
-        </p:nvSpPr>
-        <p:spPr>
-          <a:xfrm>
-            <a:off x="311700" y="1152475"/>
-            <a:ext cx="8520600" cy="3416400"/>
-          </a:xfrm>
-          <a:prstGeom prst="rect">
-            <a:avLst/>
-          </a:prstGeom>
-        </p:spPr>
-        <p:txBody>
-          <a:bodyPr anchorCtr="0" anchor="t" bIns="91425" lIns="91425" spcFirstLastPara="1" rIns="91425" wrap="square" tIns="91425">
-            <a:noAutofit/>
-          </a:bodyPr>
-          <a:lstStyle/>
-          <a:p>
-            <a:pPr indent="-342900" lvl="0" marL="457200" rtl="0" algn="l">
-              <a:spcBef>
-                <a:spcPts val="0"/>
-              </a:spcBef>
-              <a:spcAft>
-                <a:spcPts val="0"/>
-              </a:spcAft>
-              <a:buSzPts val="1800"/>
-              <a:buChar char="-"/>
-            </a:pPr>
-            <a:r>
-              <a:rPr lang="en"/>
               <a:t>Supported H</a:t>
             </a:r>
             <a:r>
@@ -8896,23 +9064,6 @@
               </a:rPr>
               <a:t>https://hl7.org/fhir/STU3/</a:t>
             </a:r>
-            <a:endParaRPr/>
-          </a:p>
-          <a:p>
-            <a:pPr indent="-342900" lvl="0" marL="457200" rtl="0" algn="l">
-              <a:spcBef>
-                <a:spcPts val="0"/>
-              </a:spcBef>
-              <a:spcAft>
-                <a:spcPts val="0"/>
-              </a:spcAft>
-              <a:buSzPts val="1800"/>
-              <a:buChar char="-"/>
-            </a:pPr>
-            <a:r>
-              <a:rPr lang="en"/>
-              <a:t>DHIS 2 FHIR Adapter:</a:t>
-            </a:r>
             <a:br>
               <a:rPr lang="en"/>
             </a:br>
@@ -8922,6 +9073,35 @@
                   <a:schemeClr val="hlink"/>
                 </a:solidFill>
                 <a:hlinkClick r:id="rId4"/>
+              </a:rPr>
+              <a:t>https://hl7.org/fhir/R4/</a:t>
+            </a:r>
+            <a:endParaRPr/>
+          </a:p>
+          <a:p>
+            <a:pPr indent="-342900" lvl="0" marL="457200" rtl="0" algn="l">
+              <a:spcBef>
+                <a:spcPts val="0"/>
+              </a:spcBef>
+              <a:spcAft>
+                <a:spcPts val="0"/>
+              </a:spcAft>
+              <a:buSzPts val="1800"/>
+              <a:buChar char="-"/>
+            </a:pPr>
+            <a:r>
+              <a:rPr lang="en"/>
+              <a:t>DHIS 2 FHIR Adapter:</a:t>
+            </a:r>
+            <a:br>
+              <a:rPr lang="en"/>
+            </a:br>
+            <a:r>
+              <a:rPr lang="en" u="sng">
+                <a:solidFill>
+                  <a:schemeClr val="hlink"/>
+                </a:solidFill>
+                <a:hlinkClick r:id="rId5"/>
               </a:rPr>
               <a:t>https://github.com/dhis2/dhis2-fhir-adapter</a:t>
             </a:r>
@@ -10047,7 +10227,7 @@
             </a:pPr>
             <a:r>
               <a:rPr lang="en"/>
-              <a:t>Assignment data (long term, e.g. rule based assignments of </a:t>
+              <a:t>Assignment data (permanent, e.g. rule based assignments of </a:t>
             </a:r>
             <a:br>
               <a:rPr lang="en"/>
@@ -10069,6 +10249,285 @@
 </file>
 
 <file path=ppt/theme/theme1.xml><?xml version="1.0" encoding="utf-8"?>
+<a:theme xmlns:a="http://schemas.openxmlformats.org/drawingml/2006/main" xmlns:r="http://schemas.openxmlformats.org/officeDocument/2006/relationships" name="DHIS2 Default">
+  <a:themeElements>
+    <a:clrScheme name="Simple Light">
+      <a:dk1>
+        <a:srgbClr val="000000"/>
+      </a:dk1>
+      <a:lt1>
+        <a:srgbClr val="FFFFFF"/>
+      </a:lt1>
+      <a:dk2>
+        <a:srgbClr val="595959"/>
+      </a:dk2>
+      <a:lt2>
+        <a:srgbClr val="EEEEEE"/>
+      </a:lt2>
+      <a:accent1>
+        <a:srgbClr val="FFAB40"/>
+      </a:accent1>
+      <a:accent2>
+        <a:srgbClr val="212121"/>
+      </a:accent2>
+      <a:accent3>
+        <a:srgbClr val="78909C"/>
+      </a:accent3>
+      <a:accent4>
+        <a:srgbClr val="FFAB40"/>
+      </a:accent4>
+      <a:accent5>
+        <a:srgbClr val="0097A7"/>
+      </a:accent5>
+      <a:accent6>
+        <a:srgbClr val="EEFF41"/>
+      </a:accent6>
+      <a:hlink>
+        <a:srgbClr val="0097A7"/>
+      </a:hlink>
+      <a:folHlink>
+        <a:srgbClr val="0097A7"/>
+      </a:folHlink>
+    </a:clrScheme>
+    <a:fontScheme name="Office">
+      <a:majorFont>
+        <a:latin typeface="Arial"/>
+        <a:ea typeface=""/>
+        <a:cs typeface=""/>
+        <a:font script="Jpan" typeface="ＭＳ Ｐゴシック"/>
+        <a:font script="Hang" typeface="맑은 고딕"/>
+        <a:font script="Hans" typeface="宋体"/>
+        <a:font script="Hant" typeface="新細明體"/>
+        <a:font script="Arab" typeface="Times New Roman"/>
+        <a:font script="Hebr" typeface="Times New Roman"/>
+        <a:font script="Thai" typeface="Angsana New"/>
+        <a:font script="Ethi" typeface="Nyala"/>
+        <a:font script="Beng" typeface="Vrinda"/>
+        <a:font script="Gujr" typeface="Shruti"/>
+        <a:font script="Khmr" typeface="MoolBoran"/>
+        <a:font script="Knda" typeface="Tunga"/>
+        <a:font script="Guru" typeface="Raavi"/>
+        <a:font script="Cans" typeface="Euphemia"/>
+        <a:font script="Cher" typeface="Plantagenet Cherokee"/>
+        <a:font script="Yiii" typeface="Microsoft Yi Baiti"/>
+        <a:font script="Tibt" typeface="Microsoft Himalaya"/>
+        <a:font script="Thaa" typeface="MV Boli"/>
+        <a:font script="Deva" typeface="Mangal"/>
+        <a:font script="Telu" typeface="Gautami"/>
+        <a:font script="Taml" typeface="Latha"/>
+        <a:font script="Syrc" typeface="Estrangelo Edessa"/>
+        <a:font script="Orya" typeface="Kalinga"/>
+        <a:font script="Mlym" typeface="Kartika"/>
+        <a:font script="Laoo" typeface="DokChampa"/>
+        <a:font script="Sinh" typeface="Iskoola Pota"/>
+        <a:font script="Mong" typeface="Mongolian Baiti"/>
+        <a:font script="Viet" typeface="Times New Roman"/>
+        <a:font script="Uigh" typeface="Microsoft Uighur"/>
+        <a:font script="Geor" typeface="Sylfaen"/>
+      </a:majorFont>
+      <a:minorFont>
+        <a:latin typeface="Arial"/>
+        <a:ea typeface=""/>
+        <a:cs typeface=""/>
+        <a:font script="Jpan" typeface="ＭＳ Ｐゴシック"/>
+        <a:font script="Hang" typeface="맑은 고딕"/>
+        <a:font script="Hans" typeface="宋体"/>
+        <a:font script="Hant" typeface="新細明體"/>
+        <a:font script="Arab" typeface="Arial"/>
+        <a:font script="Hebr" typeface="Arial"/>
+        <a:font script="Thai" typeface="Cordia New"/>
+        <a:font script="Ethi" typeface="Nyala"/>
+        <a:font script="Beng" typeface="Vrinda"/>
+        <a:font script="Gujr" typeface="Shruti"/>
+        <a:font script="Khmr" typeface="DaunPenh"/>
+        <a:font script="Knda" typeface="Tunga"/>
+        <a:font script="Guru" typeface="Raavi"/>
+        <a:font script="Cans" typeface="Euphemia"/>
+        <a:font script="Cher" typeface="Plantagenet Cherokee"/>
+        <a:font script="Yiii" typeface="Microsoft Yi Baiti"/>
+        <a:font script="Tibt" typeface="Microsoft Himalaya"/>
+        <a:font script="Thaa" typeface="MV Boli"/>
+        <a:font script="Deva" typeface="Mangal"/>
+        <a:font script="Telu" typeface="Gautami"/>
+        <a:font script="Taml" typeface="Latha"/>
+        <a:font script="Syrc" typeface="Estrangelo Edessa"/>
+        <a:font script="Orya" typeface="Kalinga"/>
+        <a:font script="Mlym" typeface="Kartika"/>
+        <a:font script="Laoo" typeface="DokChampa"/>
+        <a:font script="Sinh" typeface="Iskoola Pota"/>
+        <a:font script="Mong" typeface="Mongolian Baiti"/>
+        <a:font script="Viet" typeface="Arial"/>
+        <a:font script="Uigh" typeface="Microsoft Uighur"/>
+        <a:font script="Geor" typeface="Sylfaen"/>
+      </a:minorFont>
+    </a:fontScheme>
+    <a:fmtScheme name="Office">
+      <a:fillStyleLst>
+        <a:solidFill>
+          <a:schemeClr val="phClr"/>
+        </a:solidFill>
+        <a:gradFill rotWithShape="1">
+          <a:gsLst>
+            <a:gs pos="0">
+              <a:schemeClr val="phClr">
+                <a:tint val="50000"/>
+                <a:satMod val="300000"/>
+              </a:schemeClr>
+            </a:gs>
+            <a:gs pos="35000">
+              <a:schemeClr val="phClr">
+                <a:tint val="37000"/>
+                <a:satMod val="300000"/>
+              </a:schemeClr>
+            </a:gs>
+            <a:gs pos="100000">
+              <a:schemeClr val="phClr">
+                <a:tint val="15000"/>
+                <a:satMod val="350000"/>
+              </a:schemeClr>
+            </a:gs>
+          </a:gsLst>
+          <a:lin ang="16200000" scaled="1"/>
+        </a:gradFill>
+        <a:gradFill rotWithShape="1">
+          <a:gsLst>
+            <a:gs pos="0">
+              <a:schemeClr val="phClr">
+                <a:tint val="100000"/>
+                <a:shade val="100000"/>
+                <a:satMod val="130000"/>
+              </a:schemeClr>
+            </a:gs>
+            <a:gs pos="100000">
+              <a:schemeClr val="phClr">
+                <a:tint val="50000"/>
+                <a:shade val="100000"/>
+                <a:satMod val="350000"/>
+              </a:schemeClr>
+            </a:gs>
+          </a:gsLst>
+          <a:lin ang="16200000" scaled="0"/>
+        </a:gradFill>
+      </a:fillStyleLst>
+      <a:lnStyleLst>
+        <a:ln w="9525" cap="flat" cmpd="sng" algn="ctr">
+          <a:solidFill>
+            <a:schemeClr val="phClr">
+              <a:shade val="95000"/>
+              <a:satMod val="105000"/>
+            </a:schemeClr>
+          </a:solidFill>
+          <a:prstDash val="solid"/>
+        </a:ln>
+        <a:ln w="25400" cap="flat" cmpd="sng" algn="ctr">
+          <a:solidFill>
+            <a:schemeClr val="phClr"/>
+          </a:solidFill>
+          <a:prstDash val="solid"/>
+        </a:ln>
+        <a:ln w="38100" cap="flat" cmpd="sng" algn="ctr">
+          <a:solidFill>
+            <a:schemeClr val="phClr"/>
+          </a:solidFill>
+          <a:prstDash val="solid"/>
+        </a:ln>
+      </a:lnStyleLst>
+      <a:effectStyleLst>
+        <a:effectStyle>
+          <a:effectLst>
+            <a:outerShdw blurRad="40000" dist="20000" dir="5400000" rotWithShape="0">
+              <a:srgbClr val="000000">
+                <a:alpha val="38000"/>
+              </a:srgbClr>
+            </a:outerShdw>
+          </a:effectLst>
+        </a:effectStyle>
+        <a:effectStyle>
+          <a:effectLst>
+            <a:outerShdw blurRad="40000" dist="23000" dir="5400000" rotWithShape="0">
+              <a:srgbClr val="000000">
+                <a:alpha val="35000"/>
+              </a:srgbClr>
+            </a:outerShdw>
+          </a:effectLst>
+        </a:effectStyle>
+        <a:effectStyle>
+          <a:effectLst>
+            <a:outerShdw blurRad="40000" dist="23000" dir="5400000" rotWithShape="0">
+              <a:srgbClr val="000000">
+                <a:alpha val="35000"/>
+              </a:srgbClr>
+            </a:outerShdw>
+          </a:effectLst>
+          <a:scene3d>
+            <a:camera prst="orthographicFront">
+              <a:rot lat="0" lon="0" rev="0"/>
+            </a:camera>
+            <a:lightRig rig="threePt" dir="t">
+              <a:rot lat="0" lon="0" rev="1200000"/>
+            </a:lightRig>
+          </a:scene3d>
+          <a:sp3d>
+            <a:bevelT w="63500" h="25400"/>
+          </a:sp3d>
+        </a:effectStyle>
+      </a:effectStyleLst>
+      <a:bgFillStyleLst>
+        <a:solidFill>
+          <a:schemeClr val="phClr"/>
+        </a:solidFill>
+        <a:gradFill rotWithShape="1">
+          <a:gsLst>
+            <a:gs pos="0">
+              <a:schemeClr val="phClr">
+                <a:tint val="40000"/>
+                <a:satMod val="350000"/>
+              </a:schemeClr>
+            </a:gs>
+            <a:gs pos="40000">
+              <a:schemeClr val="phClr">
+                <a:tint val="45000"/>
+                <a:shade val="99000"/>
+                <a:satMod val="350000"/>
+              </a:schemeClr>
+            </a:gs>
+            <a:gs pos="100000">
+              <a:schemeClr val="phClr">
+                <a:shade val="20000"/>
+                <a:satMod val="255000"/>
+              </a:schemeClr>
+            </a:gs>
+          </a:gsLst>
+          <a:path path="circle">
+            <a:fillToRect l="50000" t="-80000" r="50000" b="180000"/>
+          </a:path>
+        </a:gradFill>
+        <a:gradFill rotWithShape="1">
+          <a:gsLst>
+            <a:gs pos="0">
+              <a:schemeClr val="phClr">
+                <a:tint val="80000"/>
+                <a:satMod val="300000"/>
+              </a:schemeClr>
+            </a:gs>
+            <a:gs pos="100000">
+              <a:schemeClr val="phClr">
+                <a:shade val="30000"/>
+                <a:satMod val="200000"/>
+              </a:schemeClr>
+            </a:gs>
+          </a:gsLst>
+          <a:path path="circle">
+            <a:fillToRect l="50000" t="50000" r="50000" b="50000"/>
+          </a:path>
+        </a:gradFill>
+      </a:bgFillStyleLst>
+    </a:fmtScheme>
+  </a:themeElements>
+</a:theme>
+</file>
+
+<file path=ppt/theme/theme2.xml><?xml version="1.0" encoding="utf-8"?>
 <a:theme xmlns:a="http://schemas.openxmlformats.org/drawingml/2006/main" xmlns:r="http://schemas.openxmlformats.org/officeDocument/2006/relationships">
   <a:themeElements>
     <a:clrScheme name="Default">
@@ -10345,283 +10804,4 @@
     </a:fmtScheme>
   </a:themeElements>
 </a:theme>
-</file>
-
-<file path=ppt/theme/theme2.xml><?xml version="1.0" encoding="utf-8"?>
-<a:theme xmlns:a="http://schemas.openxmlformats.org/drawingml/2006/main" xmlns:r="http://schemas.openxmlformats.org/officeDocument/2006/relationships" name="DHIS2 Default">
-  <a:themeElements>
-    <a:clrScheme name="Simple Light">
-      <a:dk1>
-        <a:srgbClr val="000000"/>
-      </a:dk1>
-      <a:lt1>
-        <a:srgbClr val="FFFFFF"/>
-      </a:lt1>
-      <a:dk2>
-        <a:srgbClr val="595959"/>
-      </a:dk2>
-      <a:lt2>
-        <a:srgbClr val="EEEEEE"/>
-      </a:lt2>
-      <a:accent1>
-        <a:srgbClr val="FFAB40"/>
-      </a:accent1>
-      <a:accent2>
-        <a:srgbClr val="212121"/>
-      </a:accent2>
-      <a:accent3>
-        <a:srgbClr val="78909C"/>
-      </a:accent3>
-      <a:accent4>
-        <a:srgbClr val="FFAB40"/>
-      </a:accent4>
-      <a:accent5>
-        <a:srgbClr val="0097A7"/>
-      </a:accent5>
-      <a:accent6>
-        <a:srgbClr val="EEFF41"/>
-      </a:accent6>
-      <a:hlink>
-        <a:srgbClr val="0097A7"/>
-      </a:hlink>
-      <a:folHlink>
-        <a:srgbClr val="0097A7"/>
-      </a:folHlink>
-    </a:clrScheme>
-    <a:fontScheme name="Office">
-      <a:majorFont>
-        <a:latin typeface="Arial"/>
-        <a:ea typeface=""/>
-        <a:cs typeface=""/>
-        <a:font script="Jpan" typeface="ＭＳ Ｐゴシック"/>
-        <a:font script="Hang" typeface="맑은 고딕"/>
-        <a:font script="Hans" typeface="宋体"/>
-        <a:font script="Hant" typeface="新細明體"/>
-        <a:font script="Arab" typeface="Times New Roman"/>
-        <a:font script="Hebr" typeface="Times New Roman"/>
-        <a:font script="Thai" typeface="Angsana New"/>
-        <a:font script="Ethi" typeface="Nyala"/>
-        <a:font script="Beng" typeface="Vrinda"/>
-        <a:font script="Gujr" typeface="Shruti"/>
-        <a:font script="Khmr" typeface="MoolBoran"/>
-        <a:font script="Knda" typeface="Tunga"/>
-        <a:font script="Guru" typeface="Raavi"/>
-        <a:font script="Cans" typeface="Euphemia"/>
-        <a:font script="Cher" typeface="Plantagenet Cherokee"/>
-        <a:font script="Yiii" typeface="Microsoft Yi Baiti"/>
-        <a:font script="Tibt" typeface="Microsoft Himalaya"/>
-        <a:font script="Thaa" typeface="MV Boli"/>
-        <a:font script="Deva" typeface="Mangal"/>
-        <a:font script="Telu" typeface="Gautami"/>
-        <a:font script="Taml" typeface="Latha"/>
-        <a:font script="Syrc" typeface="Estrangelo Edessa"/>
-        <a:font script="Orya" typeface="Kalinga"/>
-        <a:font script="Mlym" typeface="Kartika"/>
-        <a:font script="Laoo" typeface="DokChampa"/>
-        <a:font script="Sinh" typeface="Iskoola Pota"/>
-        <a:font script="Mong" typeface="Mongolian Baiti"/>
-        <a:font script="Viet" typeface="Times New Roman"/>
-        <a:font script="Uigh" typeface="Microsoft Uighur"/>
-        <a:font script="Geor" typeface="Sylfaen"/>
-      </a:majorFont>
-      <a:minorFont>
-        <a:latin typeface="Arial"/>
-        <a:ea typeface=""/>
-        <a:cs typeface=""/>
-        <a:font script="Jpan" typeface="ＭＳ Ｐゴシック"/>
-        <a:font script="Hang" typeface="맑은 고딕"/>
-        <a:font script="Hans" typeface="宋体"/>
-        <a:font script="Hant" typeface="新細明體"/>
-        <a:font script="Arab" typeface="Arial"/>
-        <a:font script="Hebr" typeface="Arial"/>
-        <a:font script="Thai" typeface="Cordia New"/>
-        <a:font script="Ethi" typeface="Nyala"/>
-        <a:font script="Beng" typeface="Vrinda"/>
-        <a:font script="Gujr" typeface="Shruti"/>
-        <a:font script="Khmr" typeface="DaunPenh"/>
-        <a:font script="Knda" typeface="Tunga"/>
-        <a:font script="Guru" typeface="Raavi"/>
-        <a:font script="Cans" typeface="Euphemia"/>
-        <a:font script="Cher" typeface="Plantagenet Cherokee"/>
-        <a:font script="Yiii" typeface="Microsoft Yi Baiti"/>
-        <a:font script="Tibt" typeface="Microsoft Himalaya"/>
-        <a:font script="Thaa" typeface="MV Boli"/>
-        <a:font script="Deva" typeface="Mangal"/>
-        <a:font script="Telu" typeface="Gautami"/>
-        <a:font script="Taml" typeface="Latha"/>
-        <a:font script="Syrc" typeface="Estrangelo Edessa"/>
-        <a:font script="Orya" typeface="Kalinga"/>
-        <a:font script="Mlym" typeface="Kartika"/>
-        <a:font script="Laoo" typeface="DokChampa"/>
-        <a:font script="Sinh" typeface="Iskoola Pota"/>
-        <a:font script="Mong" typeface="Mongolian Baiti"/>
-        <a:font script="Viet" typeface="Arial"/>
-        <a:font script="Uigh" typeface="Microsoft Uighur"/>
-        <a:font script="Geor" typeface="Sylfaen"/>
-      </a:minorFont>
-    </a:fontScheme>
-    <a:fmtScheme name="Office">
-      <a:fillStyleLst>
-        <a:solidFill>
-          <a:schemeClr val="phClr"/>
-        </a:solidFill>
-        <a:gradFill rotWithShape="1">
-          <a:gsLst>
-            <a:gs pos="0">
-              <a:schemeClr val="phClr">
-                <a:tint val="50000"/>
-                <a:satMod val="300000"/>
-              </a:schemeClr>
-            </a:gs>
-            <a:gs pos="35000">
-              <a:schemeClr val="phClr">
-                <a:tint val="37000"/>
-                <a:satMod val="300000"/>
-              </a:schemeClr>
-            </a:gs>
-            <a:gs pos="100000">
-              <a:schemeClr val="phClr">
-                <a:tint val="15000"/>
-                <a:satMod val="350000"/>
-              </a:schemeClr>
-            </a:gs>
-          </a:gsLst>
-          <a:lin ang="16200000" scaled="1"/>
-        </a:gradFill>
-        <a:gradFill rotWithShape="1">
-          <a:gsLst>
-            <a:gs pos="0">
-              <a:schemeClr val="phClr">
-                <a:tint val="100000"/>
-                <a:shade val="100000"/>
-                <a:satMod val="130000"/>
-              </a:schemeClr>
-            </a:gs>
-            <a:gs pos="100000">
-              <a:schemeClr val="phClr">
-                <a:tint val="50000"/>
-                <a:shade val="100000"/>
-                <a:satMod val="350000"/>
-              </a:schemeClr>
-            </a:gs>
-          </a:gsLst>
-          <a:lin ang="16200000" scaled="0"/>
-        </a:gradFill>
-      </a:fillStyleLst>
-      <a:lnStyleLst>
-        <a:ln w="9525" cap="flat" cmpd="sng" algn="ctr">
-          <a:solidFill>
-            <a:schemeClr val="phClr">
-              <a:shade val="95000"/>
-              <a:satMod val="105000"/>
-            </a:schemeClr>
-          </a:solidFill>
-          <a:prstDash val="solid"/>
-        </a:ln>
-        <a:ln w="25400" cap="flat" cmpd="sng" algn="ctr">
-          <a:solidFill>
-            <a:schemeClr val="phClr"/>
-          </a:solidFill>
-          <a:prstDash val="solid"/>
-        </a:ln>
-        <a:ln w="38100" cap="flat" cmpd="sng" algn="ctr">
-          <a:solidFill>
-            <a:schemeClr val="phClr"/>
-          </a:solidFill>
-          <a:prstDash val="solid"/>
-        </a:ln>
-      </a:lnStyleLst>
-      <a:effectStyleLst>
-        <a:effectStyle>
-          <a:effectLst>
-            <a:outerShdw blurRad="40000" dist="20000" dir="5400000" rotWithShape="0">
-              <a:srgbClr val="000000">
-                <a:alpha val="38000"/>
-              </a:srgbClr>
-            </a:outerShdw>
-          </a:effectLst>
-        </a:effectStyle>
-        <a:effectStyle>
-          <a:effectLst>
-            <a:outerShdw blurRad="40000" dist="23000" dir="5400000" rotWithShape="0">
-              <a:srgbClr val="000000">
-                <a:alpha val="35000"/>
-              </a:srgbClr>
-            </a:outerShdw>
-          </a:effectLst>
-        </a:effectStyle>
-        <a:effectStyle>
-          <a:effectLst>
-            <a:outerShdw blurRad="40000" dist="23000" dir="5400000" rotWithShape="0">
-              <a:srgbClr val="000000">
-                <a:alpha val="35000"/>
-              </a:srgbClr>
-            </a:outerShdw>
-          </a:effectLst>
-          <a:scene3d>
-            <a:camera prst="orthographicFront">
-              <a:rot lat="0" lon="0" rev="0"/>
-            </a:camera>
-            <a:lightRig rig="threePt" dir="t">
-              <a:rot lat="0" lon="0" rev="1200000"/>
-            </a:lightRig>
-          </a:scene3d>
-          <a:sp3d>
-            <a:bevelT w="63500" h="25400"/>
-          </a:sp3d>
-        </a:effectStyle>
-      </a:effectStyleLst>
-      <a:bgFillStyleLst>
-        <a:solidFill>
-          <a:schemeClr val="phClr"/>
-        </a:solidFill>
-        <a:gradFill rotWithShape="1">
-          <a:gsLst>
-            <a:gs pos="0">
-              <a:schemeClr val="phClr">
-                <a:tint val="40000"/>
-                <a:satMod val="350000"/>
-              </a:schemeClr>
-            </a:gs>
-            <a:gs pos="40000">
-              <a:schemeClr val="phClr">
-                <a:tint val="45000"/>
-                <a:shade val="99000"/>
-                <a:satMod val="350000"/>
-              </a:schemeClr>
-            </a:gs>
-            <a:gs pos="100000">
-              <a:schemeClr val="phClr">
-                <a:shade val="20000"/>
-                <a:satMod val="255000"/>
-              </a:schemeClr>
-            </a:gs>
-          </a:gsLst>
-          <a:path path="circle">
-            <a:fillToRect l="50000" t="-80000" r="50000" b="180000"/>
-          </a:path>
-        </a:gradFill>
-        <a:gradFill rotWithShape="1">
-          <a:gsLst>
-            <a:gs pos="0">
-              <a:schemeClr val="phClr">
-                <a:tint val="80000"/>
-                <a:satMod val="300000"/>
-              </a:schemeClr>
-            </a:gs>
-            <a:gs pos="100000">
-              <a:schemeClr val="phClr">
-                <a:shade val="30000"/>
-                <a:satMod val="200000"/>
-              </a:schemeClr>
-            </a:gs>
-          </a:gsLst>
-          <a:path path="circle">
-            <a:fillToRect l="50000" t="50000" r="50000" b="50000"/>
-          </a:path>
-        </a:gradFill>
-      </a:bgFillStyleLst>
-    </a:fmtScheme>
-  </a:themeElements>
-</a:theme>
 </file>
</xml_diff>

<commit_message>
Update of high level architecture description. (starting with FHIR interfaces only will be next step)
</commit_message>
<xml_diff>
--- a/docs/DHIS_2_FHIR_Adapter_-_An_Overview.pptx
+++ b/docs/DHIS_2_FHIR_Adapter_-_An_Overview.pptx
@@ -7906,7 +7906,7 @@
             </a:pPr>
             <a:r>
               <a:rPr lang="en"/>
-              <a:t>20 February 2019</a:t>
+              <a:t>26 February 2019</a:t>
             </a:r>
             <a:endParaRPr/>
           </a:p>
@@ -9192,7 +9192,7 @@
             </a:pPr>
             <a:r>
               <a:rPr lang="en"/>
-              <a:t>HL7® FHIR® REST Interfaces that create, update and read data based on rules that are defined in the Adapter (under development, feature similar to import and export).</a:t>
+              <a:t>HL7® FHIR® REST Interfaces that create, update and read data based on rules that are defined in the Adapter (current features similar to import and export).</a:t>
             </a:r>
             <a:endParaRPr/>
           </a:p>
@@ -10863,8 +10863,8 @@
         </p:blipFill>
         <p:spPr>
           <a:xfrm>
-            <a:off x="406863" y="1017725"/>
-            <a:ext cx="8330276" cy="3820975"/>
+            <a:off x="311700" y="1017725"/>
+            <a:ext cx="8435098" cy="3651124"/>
           </a:xfrm>
           <a:prstGeom prst="rect">
             <a:avLst/>

</xml_diff>

<commit_message>
Enable FHIR REST interface only mode.
</commit_message>
<xml_diff>
--- a/docs/DHIS_2_FHIR_Adapter_-_An_Overview.pptx
+++ b/docs/DHIS_2_FHIR_Adapter_-_An_Overview.pptx
@@ -7906,7 +7906,7 @@
             </a:pPr>
             <a:r>
               <a:rPr lang="en"/>
-              <a:t>26 February 2019</a:t>
+              <a:t>28 February 2019</a:t>
             </a:r>
             <a:endParaRPr/>
           </a:p>
@@ -10863,8 +10863,8 @@
         </p:blipFill>
         <p:spPr>
           <a:xfrm>
-            <a:off x="311700" y="1017725"/>
-            <a:ext cx="8435098" cy="3651124"/>
+            <a:off x="406863" y="1017725"/>
+            <a:ext cx="8330276" cy="3820975"/>
           </a:xfrm>
           <a:prstGeom prst="rect">
             <a:avLst/>

</xml_diff>

<commit_message>
Highlighted the difference between Import/Export and FHIR REST.
</commit_message>
<xml_diff>
--- a/docs/DHIS_2_FHIR_Adapter_-_An_Overview.pptx
+++ b/docs/DHIS_2_FHIR_Adapter_-_An_Overview.pptx
@@ -5,7 +5,7 @@
     <p:sldMasterId id="2147483659" r:id="rId1"/>
   </p:sldMasterIdLst>
   <p:notesMasterIdLst>
-    <p:notesMasterId r:id="rId21"/>
+    <p:notesMasterId r:id="rId22"/>
   </p:notesMasterIdLst>
   <p:sldIdLst>
     <p:sldId id="256" r:id="rId2"/>
@@ -27,16 +27,17 @@
     <p:sldId id="272" r:id="rId18"/>
     <p:sldId id="273" r:id="rId19"/>
     <p:sldId id="274" r:id="rId20"/>
+    <p:sldId id="275" r:id="rId21"/>
   </p:sldIdLst>
   <p:sldSz cx="9144000" cy="5143500" type="screen16x9"/>
   <p:notesSz cx="6858000" cy="9144000"/>
   <p:embeddedFontLst>
     <p:embeddedFont>
       <p:font typeface="Rubik" panose="020B0604020202020204" charset="-79"/>
-      <p:regular r:id="rId22"/>
-      <p:bold r:id="rId23"/>
-      <p:italic r:id="rId24"/>
-      <p:boldItalic r:id="rId25"/>
+      <p:regular r:id="rId23"/>
+      <p:bold r:id="rId24"/>
+      <p:italic r:id="rId25"/>
+      <p:boldItalic r:id="rId26"/>
     </p:embeddedFont>
   </p:embeddedFontLst>
   <p:defaultTextStyle>
@@ -1769,7 +1770,7 @@
       </p:grpSpPr>
       <p:sp>
         <p:nvSpPr>
-          <p:cNvPr id="161" name="Google Shape;161;g4f417ecd79_1_213:notes"/>
+          <p:cNvPr id="161" name="Google Shape;161;g502742df2e_0_0:notes"/>
           <p:cNvSpPr>
             <a:spLocks noGrp="1" noRot="1" noChangeAspect="1"/>
           </p:cNvSpPr>
@@ -1810,7 +1811,7 @@
       </p:sp>
       <p:sp>
         <p:nvSpPr>
-          <p:cNvPr id="162" name="Google Shape;162;g4f417ecd79_1_213:notes"/>
+          <p:cNvPr id="162" name="Google Shape;162;g502742df2e_0_0:notes"/>
           <p:cNvSpPr txBox="1">
             <a:spLocks noGrp="1"/>
           </p:cNvSpPr>
@@ -1915,6 +1916,110 @@
       <p:sp>
         <p:nvSpPr>
           <p:cNvPr id="60" name="Google Shape;60;g4f417ecd79_1_10:notes"/>
+          <p:cNvSpPr txBox="1">
+            <a:spLocks noGrp="1"/>
+          </p:cNvSpPr>
+          <p:nvPr>
+            <p:ph type="body" idx="1"/>
+          </p:nvPr>
+        </p:nvSpPr>
+        <p:spPr>
+          <a:xfrm>
+            <a:off x="685800" y="4343400"/>
+            <a:ext cx="5486400" cy="4114800"/>
+          </a:xfrm>
+          <a:prstGeom prst="rect">
+            <a:avLst/>
+          </a:prstGeom>
+        </p:spPr>
+        <p:txBody>
+          <a:bodyPr spcFirstLastPara="1" wrap="square" lIns="91425" tIns="91425" rIns="91425" bIns="91425" anchor="t" anchorCtr="0">
+            <a:noAutofit/>
+          </a:bodyPr>
+          <a:lstStyle/>
+          <a:p>
+            <a:pPr marL="0" lvl="0" indent="0" algn="l" rtl="0">
+              <a:spcBef>
+                <a:spcPts val="0"/>
+              </a:spcBef>
+              <a:spcAft>
+                <a:spcPts val="0"/>
+              </a:spcAft>
+              <a:buNone/>
+            </a:pPr>
+            <a:endParaRPr/>
+          </a:p>
+        </p:txBody>
+      </p:sp>
+    </p:spTree>
+  </p:cSld>
+  <p:clrMapOvr>
+    <a:masterClrMapping/>
+  </p:clrMapOvr>
+</p:notes>
+</file>
+
+<file path=ppt/notesSlides/notesSlide20.xml><?xml version="1.0" encoding="utf-8"?>
+<p:notes xmlns:a="http://schemas.openxmlformats.org/drawingml/2006/main" xmlns:r="http://schemas.openxmlformats.org/officeDocument/2006/relationships" xmlns:p="http://schemas.openxmlformats.org/presentationml/2006/main" showMasterSp="0" showMasterPhAnim="0">
+  <p:cSld>
+    <p:spTree>
+      <p:nvGrpSpPr>
+        <p:cNvPr id="1" name="Shape 167"/>
+        <p:cNvGrpSpPr/>
+        <p:nvPr/>
+      </p:nvGrpSpPr>
+      <p:grpSpPr>
+        <a:xfrm>
+          <a:off x="0" y="0"/>
+          <a:ext cx="0" cy="0"/>
+          <a:chOff x="0" y="0"/>
+          <a:chExt cx="0" cy="0"/>
+        </a:xfrm>
+      </p:grpSpPr>
+      <p:sp>
+        <p:nvSpPr>
+          <p:cNvPr id="168" name="Google Shape;168;g4f417ecd79_1_213:notes"/>
+          <p:cNvSpPr>
+            <a:spLocks noGrp="1" noRot="1" noChangeAspect="1"/>
+          </p:cNvSpPr>
+          <p:nvPr>
+            <p:ph type="sldImg" idx="2"/>
+          </p:nvPr>
+        </p:nvSpPr>
+        <p:spPr>
+          <a:xfrm>
+            <a:off x="381000" y="685800"/>
+            <a:ext cx="6096000" cy="3429000"/>
+          </a:xfrm>
+          <a:custGeom>
+            <a:avLst/>
+            <a:gdLst/>
+            <a:ahLst/>
+            <a:cxnLst/>
+            <a:rect l="l" t="t" r="r" b="b"/>
+            <a:pathLst>
+              <a:path w="120000" h="120000" extrusionOk="0">
+                <a:moveTo>
+                  <a:pt x="0" y="0"/>
+                </a:moveTo>
+                <a:lnTo>
+                  <a:pt x="120000" y="0"/>
+                </a:lnTo>
+                <a:lnTo>
+                  <a:pt x="120000" y="120000"/>
+                </a:lnTo>
+                <a:lnTo>
+                  <a:pt x="0" y="120000"/>
+                </a:lnTo>
+                <a:close/>
+              </a:path>
+            </a:pathLst>
+          </a:custGeom>
+        </p:spPr>
+      </p:sp>
+      <p:sp>
+        <p:nvSpPr>
+          <p:cNvPr id="169" name="Google Shape;169;g4f417ecd79_1_213:notes"/>
           <p:cNvSpPr txBox="1">
             <a:spLocks noGrp="1"/>
           </p:cNvSpPr>
@@ -7906,7 +8011,7 @@
             </a:pPr>
             <a:r>
               <a:rPr lang="en"/>
-              <a:t>28 February 2019</a:t>
+              <a:t>2 March 2019</a:t>
             </a:r>
             <a:endParaRPr/>
           </a:p>
@@ -9760,10 +9865,10 @@
               <a:buNone/>
             </a:pPr>
             <a:r>
-              <a:rPr lang="en"/>
-              <a:t>References</a:t>
+              <a:rPr lang="en" sz="2600"/>
+              <a:t>Difference Import/Export and FHIR REST Interfaces</a:t>
             </a:r>
-            <a:endParaRPr/>
+            <a:endParaRPr sz="2600"/>
           </a:p>
         </p:txBody>
       </p:sp>
@@ -9780,7 +9885,7 @@
         <p:spPr>
           <a:xfrm>
             <a:off x="311700" y="1152475"/>
-            <a:ext cx="8520600" cy="3416400"/>
+            <a:ext cx="3999900" cy="3416400"/>
           </a:xfrm>
           <a:prstGeom prst="rect">
             <a:avLst/>
@@ -9792,85 +9897,163 @@
           </a:bodyPr>
           <a:lstStyle/>
           <a:p>
-            <a:pPr marL="457200" lvl="0" indent="-342900" algn="l" rtl="0">
-              <a:spcBef>
-                <a:spcPts val="0"/>
-              </a:spcBef>
-              <a:spcAft>
-                <a:spcPts val="0"/>
-              </a:spcAft>
-              <a:buSzPts val="1800"/>
-              <a:buChar char="-"/>
+            <a:pPr marL="0" lvl="0" indent="0" algn="l" rtl="0">
+              <a:spcBef>
+                <a:spcPts val="0"/>
+              </a:spcBef>
+              <a:spcAft>
+                <a:spcPts val="0"/>
+              </a:spcAft>
+              <a:buNone/>
             </a:pPr>
             <a:r>
               <a:rPr lang="en"/>
-              <a:t>Supported HL7® FHIR® standard:</a:t>
+              <a:t>Import/Export:</a:t>
             </a:r>
-            <a:br>
-              <a:rPr lang="en"/>
-            </a:br>
-            <a:r>
-              <a:rPr lang="en" u="sng">
-                <a:solidFill>
-                  <a:schemeClr val="hlink"/>
-                </a:solidFill>
-                <a:hlinkClick r:id="rId3"/>
-              </a:rPr>
-              <a:t>https://hl7.org/fhir/STU3/</a:t>
-            </a:r>
-            <a:br>
-              <a:rPr lang="en"/>
-            </a:br>
-            <a:r>
-              <a:rPr lang="en" u="sng">
-                <a:solidFill>
-                  <a:schemeClr val="hlink"/>
-                </a:solidFill>
-                <a:hlinkClick r:id="rId4"/>
-              </a:rPr>
-              <a:t>https://hl7.org/fhir/R4/</a:t>
-            </a:r>
-            <a:endParaRPr/>
-          </a:p>
-          <a:p>
-            <a:pPr marL="457200" lvl="0" indent="-342900" algn="l" rtl="0">
-              <a:spcBef>
-                <a:spcPts val="0"/>
-              </a:spcBef>
-              <a:spcAft>
-                <a:spcPts val="0"/>
-              </a:spcAft>
-              <a:buSzPts val="1800"/>
+            <a:endParaRPr/>
+          </a:p>
+          <a:p>
+            <a:pPr marL="457200" lvl="0" indent="-317500" algn="l" rtl="0">
+              <a:spcBef>
+                <a:spcPts val="1600"/>
+              </a:spcBef>
+              <a:spcAft>
+                <a:spcPts val="0"/>
+              </a:spcAft>
+              <a:buSzPts val="1400"/>
               <a:buChar char="-"/>
             </a:pPr>
             <a:r>
               <a:rPr lang="en"/>
-              <a:t>DHIS 2 FHIR Adapter:</a:t>
+              <a:t>Resolving references to other FHIR Resources on the connected FHIR system (referenced technical IDs are not technical IDs on DHIS 2).</a:t>
             </a:r>
-            <a:br>
+            <a:endParaRPr/>
+          </a:p>
+          <a:p>
+            <a:pPr marL="457200" lvl="0" indent="-317500" algn="l" rtl="0">
+              <a:spcBef>
+                <a:spcPts val="0"/>
+              </a:spcBef>
+              <a:spcAft>
+                <a:spcPts val="0"/>
+              </a:spcAft>
+              <a:buSzPts val="1400"/>
+              <a:buChar char="-"/>
+            </a:pPr>
+            <a:r>
               <a:rPr lang="en"/>
-            </a:br>
+              <a:t>Handling technical IDs in FHIR Resources of connected FHIR systems, not of DHIS 2.</a:t>
+            </a:r>
+            <a:endParaRPr/>
+          </a:p>
+          <a:p>
+            <a:pPr marL="457200" lvl="0" indent="-317500" algn="l" rtl="0">
+              <a:spcBef>
+                <a:spcPts val="0"/>
+              </a:spcBef>
+              <a:spcAft>
+                <a:spcPts val="0"/>
+              </a:spcAft>
+              <a:buSzPts val="1400"/>
+              <a:buChar char="-"/>
+            </a:pPr>
             <a:r>
-              <a:rPr lang="en" u="sng">
-                <a:solidFill>
-                  <a:schemeClr val="hlink"/>
-                </a:solidFill>
-                <a:hlinkClick r:id="rId5"/>
-              </a:rPr>
-              <a:t>https://github.com/dhis2/dhis2-fhir-adapter</a:t>
+              <a:rPr lang="en"/>
+              <a:t>For a lot of use cases no mediators should be required since this can be handled by the Adapter.</a:t>
             </a:r>
             <a:endParaRPr/>
           </a:p>
+        </p:txBody>
+      </p:sp>
+      <p:sp>
+        <p:nvSpPr>
+          <p:cNvPr id="166" name="Google Shape;166;p31"/>
+          <p:cNvSpPr txBox="1">
+            <a:spLocks noGrp="1"/>
+          </p:cNvSpPr>
+          <p:nvPr>
+            <p:ph type="body" idx="2"/>
+          </p:nvPr>
+        </p:nvSpPr>
+        <p:spPr>
+          <a:xfrm>
+            <a:off x="4832400" y="1152475"/>
+            <a:ext cx="3999900" cy="3416400"/>
+          </a:xfrm>
+          <a:prstGeom prst="rect">
+            <a:avLst/>
+          </a:prstGeom>
+        </p:spPr>
+        <p:txBody>
+          <a:bodyPr spcFirstLastPara="1" wrap="square" lIns="91425" tIns="91425" rIns="91425" bIns="91425" anchor="t" anchorCtr="0">
+            <a:noAutofit/>
+          </a:bodyPr>
+          <a:lstStyle/>
           <a:p>
             <a:pPr marL="0" lvl="0" indent="0" algn="l" rtl="0">
               <a:spcBef>
+                <a:spcPts val="0"/>
+              </a:spcBef>
+              <a:spcAft>
+                <a:spcPts val="0"/>
+              </a:spcAft>
+              <a:buNone/>
+            </a:pPr>
+            <a:r>
+              <a:rPr lang="en"/>
+              <a:t>FHIR REST Interfaces:</a:t>
+            </a:r>
+            <a:endParaRPr/>
+          </a:p>
+          <a:p>
+            <a:pPr marL="457200" lvl="0" indent="-317500" algn="l" rtl="0">
+              <a:spcBef>
                 <a:spcPts val="1600"/>
               </a:spcBef>
               <a:spcAft>
-                <a:spcPts val="1600"/>
-              </a:spcAft>
-              <a:buNone/>
-            </a:pPr>
+                <a:spcPts val="0"/>
+              </a:spcAft>
+              <a:buSzPts val="1400"/>
+              <a:buChar char="-"/>
+            </a:pPr>
+            <a:r>
+              <a:rPr lang="en"/>
+              <a:t>Resolving references to other FHIR Resources on DHIS 2 (referenced technical IDs contain technical IDs of DHIS 2).</a:t>
+            </a:r>
+            <a:endParaRPr/>
+          </a:p>
+          <a:p>
+            <a:pPr marL="457200" lvl="0" indent="-317500" algn="l" rtl="0">
+              <a:spcBef>
+                <a:spcPts val="0"/>
+              </a:spcBef>
+              <a:spcAft>
+                <a:spcPts val="0"/>
+              </a:spcAft>
+              <a:buSzPts val="1400"/>
+              <a:buChar char="-"/>
+            </a:pPr>
+            <a:r>
+              <a:rPr lang="en"/>
+              <a:t>All technical IDs that are handled and returned by the Adapter are related to technical IDs on DHIS 2.</a:t>
+            </a:r>
+            <a:endParaRPr/>
+          </a:p>
+          <a:p>
+            <a:pPr marL="457200" lvl="0" indent="-317500" algn="l" rtl="0">
+              <a:spcBef>
+                <a:spcPts val="0"/>
+              </a:spcBef>
+              <a:spcAft>
+                <a:spcPts val="0"/>
+              </a:spcAft>
+              <a:buSzPts val="1400"/>
+              <a:buChar char="-"/>
+            </a:pPr>
+            <a:r>
+              <a:rPr lang="en"/>
+              <a:t>If the connected system or client is not able to handle the references to DHIS 2, additional mediators may be required.</a:t>
+            </a:r>
             <a:endParaRPr/>
           </a:p>
         </p:txBody>
@@ -9946,6 +10129,181 @@
               <a:t>(Fast Healthcare Interoperability Resources)</a:t>
             </a:r>
             <a:endParaRPr sz="3000"/>
+          </a:p>
+        </p:txBody>
+      </p:sp>
+    </p:spTree>
+  </p:cSld>
+  <p:clrMapOvr>
+    <a:masterClrMapping/>
+  </p:clrMapOvr>
+</p:sld>
+</file>
+
+<file path=ppt/slides/slide20.xml><?xml version="1.0" encoding="utf-8"?>
+<p:sld xmlns:a="http://schemas.openxmlformats.org/drawingml/2006/main" xmlns:r="http://schemas.openxmlformats.org/officeDocument/2006/relationships" xmlns:p="http://schemas.openxmlformats.org/presentationml/2006/main">
+  <p:cSld>
+    <p:spTree>
+      <p:nvGrpSpPr>
+        <p:cNvPr id="1" name="Shape 170"/>
+        <p:cNvGrpSpPr/>
+        <p:nvPr/>
+      </p:nvGrpSpPr>
+      <p:grpSpPr>
+        <a:xfrm>
+          <a:off x="0" y="0"/>
+          <a:ext cx="0" cy="0"/>
+          <a:chOff x="0" y="0"/>
+          <a:chExt cx="0" cy="0"/>
+        </a:xfrm>
+      </p:grpSpPr>
+      <p:sp>
+        <p:nvSpPr>
+          <p:cNvPr id="171" name="Google Shape;171;p32"/>
+          <p:cNvSpPr txBox="1">
+            <a:spLocks noGrp="1"/>
+          </p:cNvSpPr>
+          <p:nvPr>
+            <p:ph type="title"/>
+          </p:nvPr>
+        </p:nvSpPr>
+        <p:spPr>
+          <a:xfrm>
+            <a:off x="311700" y="445025"/>
+            <a:ext cx="8520600" cy="572700"/>
+          </a:xfrm>
+          <a:prstGeom prst="rect">
+            <a:avLst/>
+          </a:prstGeom>
+        </p:spPr>
+        <p:txBody>
+          <a:bodyPr spcFirstLastPara="1" wrap="square" lIns="91425" tIns="91425" rIns="91425" bIns="91425" anchor="t" anchorCtr="0">
+            <a:noAutofit/>
+          </a:bodyPr>
+          <a:lstStyle/>
+          <a:p>
+            <a:pPr marL="0" lvl="0" indent="0" algn="l" rtl="0">
+              <a:spcBef>
+                <a:spcPts val="0"/>
+              </a:spcBef>
+              <a:spcAft>
+                <a:spcPts val="0"/>
+              </a:spcAft>
+              <a:buNone/>
+            </a:pPr>
+            <a:r>
+              <a:rPr lang="en"/>
+              <a:t>References</a:t>
+            </a:r>
+            <a:endParaRPr/>
+          </a:p>
+        </p:txBody>
+      </p:sp>
+      <p:sp>
+        <p:nvSpPr>
+          <p:cNvPr id="172" name="Google Shape;172;p32"/>
+          <p:cNvSpPr txBox="1">
+            <a:spLocks noGrp="1"/>
+          </p:cNvSpPr>
+          <p:nvPr>
+            <p:ph type="body" idx="1"/>
+          </p:nvPr>
+        </p:nvSpPr>
+        <p:spPr>
+          <a:xfrm>
+            <a:off x="311700" y="1152475"/>
+            <a:ext cx="8520600" cy="3416400"/>
+          </a:xfrm>
+          <a:prstGeom prst="rect">
+            <a:avLst/>
+          </a:prstGeom>
+        </p:spPr>
+        <p:txBody>
+          <a:bodyPr spcFirstLastPara="1" wrap="square" lIns="91425" tIns="91425" rIns="91425" bIns="91425" anchor="t" anchorCtr="0">
+            <a:noAutofit/>
+          </a:bodyPr>
+          <a:lstStyle/>
+          <a:p>
+            <a:pPr marL="457200" lvl="0" indent="-342900" algn="l" rtl="0">
+              <a:spcBef>
+                <a:spcPts val="0"/>
+              </a:spcBef>
+              <a:spcAft>
+                <a:spcPts val="0"/>
+              </a:spcAft>
+              <a:buSzPts val="1800"/>
+              <a:buChar char="-"/>
+            </a:pPr>
+            <a:r>
+              <a:rPr lang="en"/>
+              <a:t>Supported HL7® FHIR® standard:</a:t>
+            </a:r>
+            <a:br>
+              <a:rPr lang="en"/>
+            </a:br>
+            <a:r>
+              <a:rPr lang="en" u="sng">
+                <a:solidFill>
+                  <a:schemeClr val="hlink"/>
+                </a:solidFill>
+                <a:hlinkClick r:id="rId3"/>
+              </a:rPr>
+              <a:t>https://hl7.org/fhir/STU3/</a:t>
+            </a:r>
+            <a:br>
+              <a:rPr lang="en"/>
+            </a:br>
+            <a:r>
+              <a:rPr lang="en" u="sng">
+                <a:solidFill>
+                  <a:schemeClr val="hlink"/>
+                </a:solidFill>
+                <a:hlinkClick r:id="rId4"/>
+              </a:rPr>
+              <a:t>https://hl7.org/fhir/R4/</a:t>
+            </a:r>
+            <a:endParaRPr/>
+          </a:p>
+          <a:p>
+            <a:pPr marL="457200" lvl="0" indent="-342900" algn="l" rtl="0">
+              <a:spcBef>
+                <a:spcPts val="0"/>
+              </a:spcBef>
+              <a:spcAft>
+                <a:spcPts val="0"/>
+              </a:spcAft>
+              <a:buSzPts val="1800"/>
+              <a:buChar char="-"/>
+            </a:pPr>
+            <a:r>
+              <a:rPr lang="en"/>
+              <a:t>DHIS 2 FHIR Adapter:</a:t>
+            </a:r>
+            <a:br>
+              <a:rPr lang="en"/>
+            </a:br>
+            <a:r>
+              <a:rPr lang="en" u="sng">
+                <a:solidFill>
+                  <a:schemeClr val="hlink"/>
+                </a:solidFill>
+                <a:hlinkClick r:id="rId5"/>
+              </a:rPr>
+              <a:t>https://github.com/dhis2/dhis2-fhir-adapter</a:t>
+            </a:r>
+            <a:endParaRPr/>
+          </a:p>
+          <a:p>
+            <a:pPr marL="0" lvl="0" indent="0" algn="l" rtl="0">
+              <a:spcBef>
+                <a:spcPts val="1600"/>
+              </a:spcBef>
+              <a:spcAft>
+                <a:spcPts val="1600"/>
+              </a:spcAft>
+              <a:buNone/>
+            </a:pPr>
+            <a:endParaRPr/>
           </a:p>
         </p:txBody>
       </p:sp>

</xml_diff>